<commit_message>
Renamed ProjectArken to Revoked
</commit_message>
<xml_diff>
--- a/Revoked.Web/Client/assets/TitleCard/TitleCard.pptx
+++ b/Revoked.Web/Client/assets/TitleCard/TitleCard.pptx
@@ -262,7 +262,7 @@
           <a:p>
             <a:fld id="{43FB9E9D-08C5-4740-AC9D-790C2406D3A2}" type="datetimeFigureOut">
               <a:rPr lang="en-GB" smtClean="0"/>
-              <a:t>28/09/2019</a:t>
+              <a:t>05/10/2019</a:t>
             </a:fld>
             <a:endParaRPr lang="en-GB"/>
           </a:p>
@@ -462,7 +462,7 @@
           <a:p>
             <a:fld id="{43FB9E9D-08C5-4740-AC9D-790C2406D3A2}" type="datetimeFigureOut">
               <a:rPr lang="en-GB" smtClean="0"/>
-              <a:t>28/09/2019</a:t>
+              <a:t>05/10/2019</a:t>
             </a:fld>
             <a:endParaRPr lang="en-GB"/>
           </a:p>
@@ -672,7 +672,7 @@
           <a:p>
             <a:fld id="{43FB9E9D-08C5-4740-AC9D-790C2406D3A2}" type="datetimeFigureOut">
               <a:rPr lang="en-GB" smtClean="0"/>
-              <a:t>28/09/2019</a:t>
+              <a:t>05/10/2019</a:t>
             </a:fld>
             <a:endParaRPr lang="en-GB"/>
           </a:p>
@@ -872,7 +872,7 @@
           <a:p>
             <a:fld id="{43FB9E9D-08C5-4740-AC9D-790C2406D3A2}" type="datetimeFigureOut">
               <a:rPr lang="en-GB" smtClean="0"/>
-              <a:t>28/09/2019</a:t>
+              <a:t>05/10/2019</a:t>
             </a:fld>
             <a:endParaRPr lang="en-GB"/>
           </a:p>
@@ -1148,7 +1148,7 @@
           <a:p>
             <a:fld id="{43FB9E9D-08C5-4740-AC9D-790C2406D3A2}" type="datetimeFigureOut">
               <a:rPr lang="en-GB" smtClean="0"/>
-              <a:t>28/09/2019</a:t>
+              <a:t>05/10/2019</a:t>
             </a:fld>
             <a:endParaRPr lang="en-GB"/>
           </a:p>
@@ -1416,7 +1416,7 @@
           <a:p>
             <a:fld id="{43FB9E9D-08C5-4740-AC9D-790C2406D3A2}" type="datetimeFigureOut">
               <a:rPr lang="en-GB" smtClean="0"/>
-              <a:t>28/09/2019</a:t>
+              <a:t>05/10/2019</a:t>
             </a:fld>
             <a:endParaRPr lang="en-GB"/>
           </a:p>
@@ -1831,7 +1831,7 @@
           <a:p>
             <a:fld id="{43FB9E9D-08C5-4740-AC9D-790C2406D3A2}" type="datetimeFigureOut">
               <a:rPr lang="en-GB" smtClean="0"/>
-              <a:t>28/09/2019</a:t>
+              <a:t>05/10/2019</a:t>
             </a:fld>
             <a:endParaRPr lang="en-GB"/>
           </a:p>
@@ -1973,7 +1973,7 @@
           <a:p>
             <a:fld id="{43FB9E9D-08C5-4740-AC9D-790C2406D3A2}" type="datetimeFigureOut">
               <a:rPr lang="en-GB" smtClean="0"/>
-              <a:t>28/09/2019</a:t>
+              <a:t>05/10/2019</a:t>
             </a:fld>
             <a:endParaRPr lang="en-GB"/>
           </a:p>
@@ -2086,7 +2086,7 @@
           <a:p>
             <a:fld id="{43FB9E9D-08C5-4740-AC9D-790C2406D3A2}" type="datetimeFigureOut">
               <a:rPr lang="en-GB" smtClean="0"/>
-              <a:t>28/09/2019</a:t>
+              <a:t>05/10/2019</a:t>
             </a:fld>
             <a:endParaRPr lang="en-GB"/>
           </a:p>
@@ -2399,7 +2399,7 @@
           <a:p>
             <a:fld id="{43FB9E9D-08C5-4740-AC9D-790C2406D3A2}" type="datetimeFigureOut">
               <a:rPr lang="en-GB" smtClean="0"/>
-              <a:t>28/09/2019</a:t>
+              <a:t>05/10/2019</a:t>
             </a:fld>
             <a:endParaRPr lang="en-GB"/>
           </a:p>
@@ -2688,7 +2688,7 @@
           <a:p>
             <a:fld id="{43FB9E9D-08C5-4740-AC9D-790C2406D3A2}" type="datetimeFigureOut">
               <a:rPr lang="en-GB" smtClean="0"/>
-              <a:t>28/09/2019</a:t>
+              <a:t>05/10/2019</a:t>
             </a:fld>
             <a:endParaRPr lang="en-GB"/>
           </a:p>
@@ -2931,7 +2931,7 @@
           <a:p>
             <a:fld id="{43FB9E9D-08C5-4740-AC9D-790C2406D3A2}" type="datetimeFigureOut">
               <a:rPr lang="en-GB" smtClean="0"/>
-              <a:t>28/09/2019</a:t>
+              <a:t>05/10/2019</a:t>
             </a:fld>
             <a:endParaRPr lang="en-GB"/>
           </a:p>
@@ -3398,8 +3398,8 @@
         </p:nvSpPr>
         <p:spPr>
           <a:xfrm>
-            <a:off x="8070509" y="5127439"/>
-            <a:ext cx="3578223" cy="923330"/>
+            <a:off x="8738961" y="5127439"/>
+            <a:ext cx="2241319" cy="923330"/>
           </a:xfrm>
           <a:prstGeom prst="rect">
             <a:avLst/>
@@ -3436,55 +3436,8 @@
                 </a:effectLst>
                 <a:latin typeface="Blackadder ITC" panose="04020505051007020D02" pitchFamily="82" charset="0"/>
               </a:rPr>
-              <a:t>Project </a:t>
-            </a:r>
-            <a:r>
-              <a:rPr lang="en-US" sz="5400" b="1" cap="none" spc="0" dirty="0" err="1">
-                <a:ln w="13462">
-                  <a:solidFill>
-                    <a:schemeClr val="bg1"/>
-                  </a:solidFill>
-                  <a:prstDash val="solid"/>
-                </a:ln>
-                <a:solidFill>
-                  <a:schemeClr val="tx1">
-                    <a:lumMod val="85000"/>
-                    <a:lumOff val="15000"/>
-                  </a:schemeClr>
-                </a:solidFill>
-                <a:effectLst>
-                  <a:outerShdw blurRad="50800" dist="38100" dir="10800000" algn="r" rotWithShape="0">
-                    <a:prstClr val="black">
-                      <a:alpha val="40000"/>
-                    </a:prstClr>
-                  </a:outerShdw>
-                </a:effectLst>
-                <a:latin typeface="Blackadder ITC" panose="04020505051007020D02" pitchFamily="82" charset="0"/>
-              </a:rPr>
-              <a:t>Arken</a:t>
-            </a:r>
-            <a:endParaRPr lang="en-US" sz="5400" b="1" cap="none" spc="0" dirty="0">
-              <a:ln w="13462">
-                <a:solidFill>
-                  <a:schemeClr val="bg1"/>
-                </a:solidFill>
-                <a:prstDash val="solid"/>
-              </a:ln>
-              <a:solidFill>
-                <a:schemeClr val="tx1">
-                  <a:lumMod val="85000"/>
-                  <a:lumOff val="15000"/>
-                </a:schemeClr>
-              </a:solidFill>
-              <a:effectLst>
-                <a:outerShdw blurRad="50800" dist="38100" dir="10800000" algn="r" rotWithShape="0">
-                  <a:prstClr val="black">
-                    <a:alpha val="40000"/>
-                  </a:prstClr>
-                </a:outerShdw>
-              </a:effectLst>
-              <a:latin typeface="Blackadder ITC" panose="04020505051007020D02" pitchFamily="82" charset="0"/>
-            </a:endParaRPr>
+              <a:t>Revoked</a:t>
+            </a:r>
           </a:p>
         </p:txBody>
       </p:sp>
@@ -3520,10 +3473,10 @@
       </p:grpSpPr>
       <p:pic>
         <p:nvPicPr>
-          <p:cNvPr id="2" name="Picture 1">
-            <a:extLst>
-              <a:ext uri="{FF2B5EF4-FFF2-40B4-BE49-F238E27FC236}">
-                <a16:creationId xmlns:a16="http://schemas.microsoft.com/office/drawing/2014/main" id="{F55D2DD5-43D8-4923-A880-A09F01E33DF8}"/>
+          <p:cNvPr id="3" name="Picture 2">
+            <a:extLst>
+              <a:ext uri="{FF2B5EF4-FFF2-40B4-BE49-F238E27FC236}">
+                <a16:creationId xmlns:a16="http://schemas.microsoft.com/office/drawing/2014/main" id="{E934575E-FF81-42C2-938B-F52E94588A9F}"/>
               </a:ext>
             </a:extLst>
           </p:cNvPr>

</xml_diff>

<commit_message>
Added info to title screen
</commit_message>
<xml_diff>
--- a/Revoked.Web/Client/assets/TitleCard/TitleCard.pptx
+++ b/Revoked.Web/Client/assets/TitleCard/TitleCard.pptx
@@ -262,7 +262,7 @@
           <a:p>
             <a:fld id="{43FB9E9D-08C5-4740-AC9D-790C2406D3A2}" type="datetimeFigureOut">
               <a:rPr lang="en-GB" smtClean="0"/>
-              <a:t>05/10/2019</a:t>
+              <a:t>10/02/2020</a:t>
             </a:fld>
             <a:endParaRPr lang="en-GB"/>
           </a:p>
@@ -462,7 +462,7 @@
           <a:p>
             <a:fld id="{43FB9E9D-08C5-4740-AC9D-790C2406D3A2}" type="datetimeFigureOut">
               <a:rPr lang="en-GB" smtClean="0"/>
-              <a:t>05/10/2019</a:t>
+              <a:t>10/02/2020</a:t>
             </a:fld>
             <a:endParaRPr lang="en-GB"/>
           </a:p>
@@ -672,7 +672,7 @@
           <a:p>
             <a:fld id="{43FB9E9D-08C5-4740-AC9D-790C2406D3A2}" type="datetimeFigureOut">
               <a:rPr lang="en-GB" smtClean="0"/>
-              <a:t>05/10/2019</a:t>
+              <a:t>10/02/2020</a:t>
             </a:fld>
             <a:endParaRPr lang="en-GB"/>
           </a:p>
@@ -872,7 +872,7 @@
           <a:p>
             <a:fld id="{43FB9E9D-08C5-4740-AC9D-790C2406D3A2}" type="datetimeFigureOut">
               <a:rPr lang="en-GB" smtClean="0"/>
-              <a:t>05/10/2019</a:t>
+              <a:t>10/02/2020</a:t>
             </a:fld>
             <a:endParaRPr lang="en-GB"/>
           </a:p>
@@ -1148,7 +1148,7 @@
           <a:p>
             <a:fld id="{43FB9E9D-08C5-4740-AC9D-790C2406D3A2}" type="datetimeFigureOut">
               <a:rPr lang="en-GB" smtClean="0"/>
-              <a:t>05/10/2019</a:t>
+              <a:t>10/02/2020</a:t>
             </a:fld>
             <a:endParaRPr lang="en-GB"/>
           </a:p>
@@ -1416,7 +1416,7 @@
           <a:p>
             <a:fld id="{43FB9E9D-08C5-4740-AC9D-790C2406D3A2}" type="datetimeFigureOut">
               <a:rPr lang="en-GB" smtClean="0"/>
-              <a:t>05/10/2019</a:t>
+              <a:t>10/02/2020</a:t>
             </a:fld>
             <a:endParaRPr lang="en-GB"/>
           </a:p>
@@ -1831,7 +1831,7 @@
           <a:p>
             <a:fld id="{43FB9E9D-08C5-4740-AC9D-790C2406D3A2}" type="datetimeFigureOut">
               <a:rPr lang="en-GB" smtClean="0"/>
-              <a:t>05/10/2019</a:t>
+              <a:t>10/02/2020</a:t>
             </a:fld>
             <a:endParaRPr lang="en-GB"/>
           </a:p>
@@ -1973,7 +1973,7 @@
           <a:p>
             <a:fld id="{43FB9E9D-08C5-4740-AC9D-790C2406D3A2}" type="datetimeFigureOut">
               <a:rPr lang="en-GB" smtClean="0"/>
-              <a:t>05/10/2019</a:t>
+              <a:t>10/02/2020</a:t>
             </a:fld>
             <a:endParaRPr lang="en-GB"/>
           </a:p>
@@ -2086,7 +2086,7 @@
           <a:p>
             <a:fld id="{43FB9E9D-08C5-4740-AC9D-790C2406D3A2}" type="datetimeFigureOut">
               <a:rPr lang="en-GB" smtClean="0"/>
-              <a:t>05/10/2019</a:t>
+              <a:t>10/02/2020</a:t>
             </a:fld>
             <a:endParaRPr lang="en-GB"/>
           </a:p>
@@ -2399,7 +2399,7 @@
           <a:p>
             <a:fld id="{43FB9E9D-08C5-4740-AC9D-790C2406D3A2}" type="datetimeFigureOut">
               <a:rPr lang="en-GB" smtClean="0"/>
-              <a:t>05/10/2019</a:t>
+              <a:t>10/02/2020</a:t>
             </a:fld>
             <a:endParaRPr lang="en-GB"/>
           </a:p>
@@ -2688,7 +2688,7 @@
           <a:p>
             <a:fld id="{43FB9E9D-08C5-4740-AC9D-790C2406D3A2}" type="datetimeFigureOut">
               <a:rPr lang="en-GB" smtClean="0"/>
-              <a:t>05/10/2019</a:t>
+              <a:t>10/02/2020</a:t>
             </a:fld>
             <a:endParaRPr lang="en-GB"/>
           </a:p>
@@ -2931,7 +2931,7 @@
           <a:p>
             <a:fld id="{43FB9E9D-08C5-4740-AC9D-790C2406D3A2}" type="datetimeFigureOut">
               <a:rPr lang="en-GB" smtClean="0"/>
-              <a:t>05/10/2019</a:t>
+              <a:t>10/02/2020</a:t>
             </a:fld>
             <a:endParaRPr lang="en-GB"/>
           </a:p>
@@ -3398,8 +3398,8 @@
         </p:nvSpPr>
         <p:spPr>
           <a:xfrm>
-            <a:off x="8738961" y="5127439"/>
-            <a:ext cx="2241319" cy="923330"/>
+            <a:off x="7514994" y="4213660"/>
+            <a:ext cx="3841116" cy="1569660"/>
           </a:xfrm>
           <a:prstGeom prst="rect">
             <a:avLst/>
@@ -3414,7 +3414,7 @@
           <a:p>
             <a:pPr algn="ctr"/>
             <a:r>
-              <a:rPr lang="en-US" sz="5400" b="1" cap="none" spc="0" dirty="0">
+              <a:rPr lang="en-US" sz="9600" b="1" cap="none" spc="0" dirty="0">
                 <a:ln w="13462">
                   <a:solidFill>
                     <a:schemeClr val="bg1"/>
@@ -3441,6 +3441,273 @@
           </a:p>
         </p:txBody>
       </p:sp>
+      <p:sp>
+        <p:nvSpPr>
+          <p:cNvPr id="4" name="Subtitle 2">
+            <a:extLst>
+              <a:ext uri="{FF2B5EF4-FFF2-40B4-BE49-F238E27FC236}">
+                <a16:creationId xmlns:a16="http://schemas.microsoft.com/office/drawing/2014/main" id="{2561096D-F808-408E-B659-656078388A94}"/>
+              </a:ext>
+            </a:extLst>
+          </p:cNvPr>
+          <p:cNvSpPr>
+            <a:spLocks noGrp="1"/>
+          </p:cNvSpPr>
+          <p:nvPr>
+            <p:ph type="subTitle" idx="1"/>
+          </p:nvPr>
+        </p:nvSpPr>
+        <p:spPr>
+          <a:xfrm>
+            <a:off x="0" y="5813164"/>
+            <a:ext cx="4651513" cy="1282440"/>
+          </a:xfrm>
+        </p:spPr>
+        <p:txBody>
+          <a:bodyPr>
+            <a:normAutofit/>
+          </a:bodyPr>
+          <a:lstStyle/>
+          <a:p>
+            <a:pPr algn="l">
+              <a:lnSpc>
+                <a:spcPct val="100000"/>
+              </a:lnSpc>
+            </a:pPr>
+            <a:r>
+              <a:rPr lang="en-GB" dirty="0">
+                <a:solidFill>
+                  <a:schemeClr val="bg1"/>
+                </a:solidFill>
+                <a:effectLst/>
+                <a:latin typeface="Calisto MT" panose="02040603050505030304" pitchFamily="18" charset="0"/>
+              </a:rPr>
+              <a:t>‘L’ for Leader board </a:t>
+            </a:r>
+          </a:p>
+          <a:p>
+            <a:pPr algn="l">
+              <a:lnSpc>
+                <a:spcPct val="100000"/>
+              </a:lnSpc>
+            </a:pPr>
+            <a:r>
+              <a:rPr lang="en-GB" dirty="0">
+                <a:solidFill>
+                  <a:schemeClr val="bg1"/>
+                </a:solidFill>
+                <a:effectLst/>
+                <a:latin typeface="Calisto MT" panose="02040603050505030304" pitchFamily="18" charset="0"/>
+              </a:rPr>
+              <a:t>‘I’ for Instructions</a:t>
+            </a:r>
+          </a:p>
+        </p:txBody>
+      </p:sp>
+      <p:sp>
+        <p:nvSpPr>
+          <p:cNvPr id="7" name="Subtitle 2">
+            <a:extLst>
+              <a:ext uri="{FF2B5EF4-FFF2-40B4-BE49-F238E27FC236}">
+                <a16:creationId xmlns:a16="http://schemas.microsoft.com/office/drawing/2014/main" id="{03AF123A-17F3-478E-8A80-4A4659D2B700}"/>
+              </a:ext>
+            </a:extLst>
+          </p:cNvPr>
+          <p:cNvSpPr txBox="1">
+            <a:spLocks/>
+          </p:cNvSpPr>
+          <p:nvPr/>
+        </p:nvSpPr>
+        <p:spPr>
+          <a:xfrm>
+            <a:off x="7901188" y="5617308"/>
+            <a:ext cx="3360275" cy="837076"/>
+          </a:xfrm>
+          <a:prstGeom prst="rect">
+            <a:avLst/>
+          </a:prstGeom>
+        </p:spPr>
+        <p:txBody>
+          <a:bodyPr vert="horz" lIns="91440" tIns="45720" rIns="91440" bIns="45720" rtlCol="0">
+            <a:normAutofit/>
+          </a:bodyPr>
+          <a:lstStyle>
+            <a:lvl1pPr marL="0" indent="0" algn="ctr" defTabSz="914400" rtl="0" eaLnBrk="1" latinLnBrk="0" hangingPunct="1">
+              <a:lnSpc>
+                <a:spcPct val="90000"/>
+              </a:lnSpc>
+              <a:spcBef>
+                <a:spcPts val="1000"/>
+              </a:spcBef>
+              <a:buFont typeface="Arial" panose="020B0604020202020204" pitchFamily="34" charset="0"/>
+              <a:buNone/>
+              <a:defRPr sz="2400" kern="1200">
+                <a:solidFill>
+                  <a:schemeClr val="tx1"/>
+                </a:solidFill>
+                <a:latin typeface="+mn-lt"/>
+                <a:ea typeface="+mn-ea"/>
+                <a:cs typeface="+mn-cs"/>
+              </a:defRPr>
+            </a:lvl1pPr>
+            <a:lvl2pPr marL="457200" indent="0" algn="ctr" defTabSz="914400" rtl="0" eaLnBrk="1" latinLnBrk="0" hangingPunct="1">
+              <a:lnSpc>
+                <a:spcPct val="90000"/>
+              </a:lnSpc>
+              <a:spcBef>
+                <a:spcPts val="500"/>
+              </a:spcBef>
+              <a:buFont typeface="Arial" panose="020B0604020202020204" pitchFamily="34" charset="0"/>
+              <a:buNone/>
+              <a:defRPr sz="2000" kern="1200">
+                <a:solidFill>
+                  <a:schemeClr val="tx1"/>
+                </a:solidFill>
+                <a:latin typeface="+mn-lt"/>
+                <a:ea typeface="+mn-ea"/>
+                <a:cs typeface="+mn-cs"/>
+              </a:defRPr>
+            </a:lvl2pPr>
+            <a:lvl3pPr marL="914400" indent="0" algn="ctr" defTabSz="914400" rtl="0" eaLnBrk="1" latinLnBrk="0" hangingPunct="1">
+              <a:lnSpc>
+                <a:spcPct val="90000"/>
+              </a:lnSpc>
+              <a:spcBef>
+                <a:spcPts val="500"/>
+              </a:spcBef>
+              <a:buFont typeface="Arial" panose="020B0604020202020204" pitchFamily="34" charset="0"/>
+              <a:buNone/>
+              <a:defRPr sz="1800" kern="1200">
+                <a:solidFill>
+                  <a:schemeClr val="tx1"/>
+                </a:solidFill>
+                <a:latin typeface="+mn-lt"/>
+                <a:ea typeface="+mn-ea"/>
+                <a:cs typeface="+mn-cs"/>
+              </a:defRPr>
+            </a:lvl3pPr>
+            <a:lvl4pPr marL="1371600" indent="0" algn="ctr" defTabSz="914400" rtl="0" eaLnBrk="1" latinLnBrk="0" hangingPunct="1">
+              <a:lnSpc>
+                <a:spcPct val="90000"/>
+              </a:lnSpc>
+              <a:spcBef>
+                <a:spcPts val="500"/>
+              </a:spcBef>
+              <a:buFont typeface="Arial" panose="020B0604020202020204" pitchFamily="34" charset="0"/>
+              <a:buNone/>
+              <a:defRPr sz="1600" kern="1200">
+                <a:solidFill>
+                  <a:schemeClr val="tx1"/>
+                </a:solidFill>
+                <a:latin typeface="+mn-lt"/>
+                <a:ea typeface="+mn-ea"/>
+                <a:cs typeface="+mn-cs"/>
+              </a:defRPr>
+            </a:lvl4pPr>
+            <a:lvl5pPr marL="1828800" indent="0" algn="ctr" defTabSz="914400" rtl="0" eaLnBrk="1" latinLnBrk="0" hangingPunct="1">
+              <a:lnSpc>
+                <a:spcPct val="90000"/>
+              </a:lnSpc>
+              <a:spcBef>
+                <a:spcPts val="500"/>
+              </a:spcBef>
+              <a:buFont typeface="Arial" panose="020B0604020202020204" pitchFamily="34" charset="0"/>
+              <a:buNone/>
+              <a:defRPr sz="1600" kern="1200">
+                <a:solidFill>
+                  <a:schemeClr val="tx1"/>
+                </a:solidFill>
+                <a:latin typeface="+mn-lt"/>
+                <a:ea typeface="+mn-ea"/>
+                <a:cs typeface="+mn-cs"/>
+              </a:defRPr>
+            </a:lvl5pPr>
+            <a:lvl6pPr marL="2286000" indent="0" algn="ctr" defTabSz="914400" rtl="0" eaLnBrk="1" latinLnBrk="0" hangingPunct="1">
+              <a:lnSpc>
+                <a:spcPct val="90000"/>
+              </a:lnSpc>
+              <a:spcBef>
+                <a:spcPts val="500"/>
+              </a:spcBef>
+              <a:buFont typeface="Arial" panose="020B0604020202020204" pitchFamily="34" charset="0"/>
+              <a:buNone/>
+              <a:defRPr sz="1600" kern="1200">
+                <a:solidFill>
+                  <a:schemeClr val="tx1"/>
+                </a:solidFill>
+                <a:latin typeface="+mn-lt"/>
+                <a:ea typeface="+mn-ea"/>
+                <a:cs typeface="+mn-cs"/>
+              </a:defRPr>
+            </a:lvl6pPr>
+            <a:lvl7pPr marL="2743200" indent="0" algn="ctr" defTabSz="914400" rtl="0" eaLnBrk="1" latinLnBrk="0" hangingPunct="1">
+              <a:lnSpc>
+                <a:spcPct val="90000"/>
+              </a:lnSpc>
+              <a:spcBef>
+                <a:spcPts val="500"/>
+              </a:spcBef>
+              <a:buFont typeface="Arial" panose="020B0604020202020204" pitchFamily="34" charset="0"/>
+              <a:buNone/>
+              <a:defRPr sz="1600" kern="1200">
+                <a:solidFill>
+                  <a:schemeClr val="tx1"/>
+                </a:solidFill>
+                <a:latin typeface="+mn-lt"/>
+                <a:ea typeface="+mn-ea"/>
+                <a:cs typeface="+mn-cs"/>
+              </a:defRPr>
+            </a:lvl7pPr>
+            <a:lvl8pPr marL="3200400" indent="0" algn="ctr" defTabSz="914400" rtl="0" eaLnBrk="1" latinLnBrk="0" hangingPunct="1">
+              <a:lnSpc>
+                <a:spcPct val="90000"/>
+              </a:lnSpc>
+              <a:spcBef>
+                <a:spcPts val="500"/>
+              </a:spcBef>
+              <a:buFont typeface="Arial" panose="020B0604020202020204" pitchFamily="34" charset="0"/>
+              <a:buNone/>
+              <a:defRPr sz="1600" kern="1200">
+                <a:solidFill>
+                  <a:schemeClr val="tx1"/>
+                </a:solidFill>
+                <a:latin typeface="+mn-lt"/>
+                <a:ea typeface="+mn-ea"/>
+                <a:cs typeface="+mn-cs"/>
+              </a:defRPr>
+            </a:lvl8pPr>
+            <a:lvl9pPr marL="3657600" indent="0" algn="ctr" defTabSz="914400" rtl="0" eaLnBrk="1" latinLnBrk="0" hangingPunct="1">
+              <a:lnSpc>
+                <a:spcPct val="90000"/>
+              </a:lnSpc>
+              <a:spcBef>
+                <a:spcPts val="500"/>
+              </a:spcBef>
+              <a:buFont typeface="Arial" panose="020B0604020202020204" pitchFamily="34" charset="0"/>
+              <a:buNone/>
+              <a:defRPr sz="1600" kern="1200">
+                <a:solidFill>
+                  <a:schemeClr val="tx1"/>
+                </a:solidFill>
+                <a:latin typeface="+mn-lt"/>
+                <a:ea typeface="+mn-ea"/>
+                <a:cs typeface="+mn-cs"/>
+              </a:defRPr>
+            </a:lvl9pPr>
+          </a:lstStyle>
+          <a:p>
+            <a:r>
+              <a:rPr lang="en-GB" dirty="0">
+                <a:solidFill>
+                  <a:schemeClr val="bg1"/>
+                </a:solidFill>
+                <a:latin typeface="Calisto MT" panose="02040603050505030304" pitchFamily="18" charset="0"/>
+              </a:rPr>
+              <a:t>Press ‘Enter’ to play!</a:t>
+            </a:r>
+          </a:p>
+        </p:txBody>
+      </p:sp>
     </p:spTree>
     <p:extLst>
       <p:ext uri="{BB962C8B-B14F-4D97-AF65-F5344CB8AC3E}">
@@ -3457,6 +3724,14 @@
 <file path=ppt/slides/slide2.xml><?xml version="1.0" encoding="utf-8"?>
 <p:sld xmlns:a="http://schemas.openxmlformats.org/drawingml/2006/main" xmlns:r="http://schemas.openxmlformats.org/officeDocument/2006/relationships" xmlns:p="http://schemas.openxmlformats.org/presentationml/2006/main">
   <p:cSld>
+    <p:bg>
+      <p:bgPr>
+        <a:solidFill>
+          <a:schemeClr val="bg1"/>
+        </a:solidFill>
+        <a:effectLst/>
+      </p:bgPr>
+    </p:bg>
     <p:spTree>
       <p:nvGrpSpPr>
         <p:cNvPr id="1" name=""/>
@@ -3473,28 +3748,29 @@
       </p:grpSpPr>
       <p:pic>
         <p:nvPicPr>
-          <p:cNvPr id="3" name="Picture 2">
-            <a:extLst>
-              <a:ext uri="{FF2B5EF4-FFF2-40B4-BE49-F238E27FC236}">
-                <a16:creationId xmlns:a16="http://schemas.microsoft.com/office/drawing/2014/main" id="{E934575E-FF81-42C2-938B-F52E94588A9F}"/>
+          <p:cNvPr id="4" name="Content Placeholder 3">
+            <a:extLst>
+              <a:ext uri="{FF2B5EF4-FFF2-40B4-BE49-F238E27FC236}">
+                <a16:creationId xmlns:a16="http://schemas.microsoft.com/office/drawing/2014/main" id="{E9BD740D-27CD-4B9C-B1BF-2AAB59372603}"/>
               </a:ext>
             </a:extLst>
           </p:cNvPr>
           <p:cNvPicPr>
-            <a:picLocks noChangeAspect="1"/>
+            <a:picLocks noGrp="1" noChangeAspect="1"/>
           </p:cNvPicPr>
-          <p:nvPr/>
+          <p:nvPr>
+            <p:ph idx="1"/>
+          </p:nvPr>
         </p:nvPicPr>
-        <p:blipFill>
+        <p:blipFill rotWithShape="1">
           <a:blip r:embed="rId2"/>
-          <a:stretch>
-            <a:fillRect/>
-          </a:stretch>
+          <a:srcRect/>
+          <a:stretch/>
         </p:blipFill>
         <p:spPr>
           <a:xfrm>
-            <a:off x="0" y="1673"/>
-            <a:ext cx="12192000" cy="6854653"/>
+            <a:off x="20" y="10"/>
+            <a:ext cx="12191980" cy="6857990"/>
           </a:xfrm>
           <a:prstGeom prst="rect">
             <a:avLst/>
@@ -3504,7 +3780,7 @@
     </p:spTree>
     <p:extLst>
       <p:ext uri="{BB962C8B-B14F-4D97-AF65-F5344CB8AC3E}">
-        <p14:creationId xmlns:p14="http://schemas.microsoft.com/office/powerpoint/2010/main" val="4223489610"/>
+        <p14:creationId xmlns:p14="http://schemas.microsoft.com/office/powerpoint/2010/main" val="285048537"/>
       </p:ext>
     </p:extLst>
   </p:cSld>

</xml_diff>

<commit_message>
Added instructions screen (#121)
* Added info to the title screen

* Added instructions screen

* Added state information
</commit_message>
<xml_diff>
--- a/Revoked.Web/Client/assets/TitleCard/TitleCard.pptx
+++ b/Revoked.Web/Client/assets/TitleCard/TitleCard.pptx
@@ -262,7 +262,7 @@
           <a:p>
             <a:fld id="{43FB9E9D-08C5-4740-AC9D-790C2406D3A2}" type="datetimeFigureOut">
               <a:rPr lang="en-GB" smtClean="0"/>
-              <a:t>05/10/2019</a:t>
+              <a:t>10/02/2020</a:t>
             </a:fld>
             <a:endParaRPr lang="en-GB"/>
           </a:p>
@@ -462,7 +462,7 @@
           <a:p>
             <a:fld id="{43FB9E9D-08C5-4740-AC9D-790C2406D3A2}" type="datetimeFigureOut">
               <a:rPr lang="en-GB" smtClean="0"/>
-              <a:t>05/10/2019</a:t>
+              <a:t>10/02/2020</a:t>
             </a:fld>
             <a:endParaRPr lang="en-GB"/>
           </a:p>
@@ -672,7 +672,7 @@
           <a:p>
             <a:fld id="{43FB9E9D-08C5-4740-AC9D-790C2406D3A2}" type="datetimeFigureOut">
               <a:rPr lang="en-GB" smtClean="0"/>
-              <a:t>05/10/2019</a:t>
+              <a:t>10/02/2020</a:t>
             </a:fld>
             <a:endParaRPr lang="en-GB"/>
           </a:p>
@@ -872,7 +872,7 @@
           <a:p>
             <a:fld id="{43FB9E9D-08C5-4740-AC9D-790C2406D3A2}" type="datetimeFigureOut">
               <a:rPr lang="en-GB" smtClean="0"/>
-              <a:t>05/10/2019</a:t>
+              <a:t>10/02/2020</a:t>
             </a:fld>
             <a:endParaRPr lang="en-GB"/>
           </a:p>
@@ -1148,7 +1148,7 @@
           <a:p>
             <a:fld id="{43FB9E9D-08C5-4740-AC9D-790C2406D3A2}" type="datetimeFigureOut">
               <a:rPr lang="en-GB" smtClean="0"/>
-              <a:t>05/10/2019</a:t>
+              <a:t>10/02/2020</a:t>
             </a:fld>
             <a:endParaRPr lang="en-GB"/>
           </a:p>
@@ -1416,7 +1416,7 @@
           <a:p>
             <a:fld id="{43FB9E9D-08C5-4740-AC9D-790C2406D3A2}" type="datetimeFigureOut">
               <a:rPr lang="en-GB" smtClean="0"/>
-              <a:t>05/10/2019</a:t>
+              <a:t>10/02/2020</a:t>
             </a:fld>
             <a:endParaRPr lang="en-GB"/>
           </a:p>
@@ -1831,7 +1831,7 @@
           <a:p>
             <a:fld id="{43FB9E9D-08C5-4740-AC9D-790C2406D3A2}" type="datetimeFigureOut">
               <a:rPr lang="en-GB" smtClean="0"/>
-              <a:t>05/10/2019</a:t>
+              <a:t>10/02/2020</a:t>
             </a:fld>
             <a:endParaRPr lang="en-GB"/>
           </a:p>
@@ -1973,7 +1973,7 @@
           <a:p>
             <a:fld id="{43FB9E9D-08C5-4740-AC9D-790C2406D3A2}" type="datetimeFigureOut">
               <a:rPr lang="en-GB" smtClean="0"/>
-              <a:t>05/10/2019</a:t>
+              <a:t>10/02/2020</a:t>
             </a:fld>
             <a:endParaRPr lang="en-GB"/>
           </a:p>
@@ -2086,7 +2086,7 @@
           <a:p>
             <a:fld id="{43FB9E9D-08C5-4740-AC9D-790C2406D3A2}" type="datetimeFigureOut">
               <a:rPr lang="en-GB" smtClean="0"/>
-              <a:t>05/10/2019</a:t>
+              <a:t>10/02/2020</a:t>
             </a:fld>
             <a:endParaRPr lang="en-GB"/>
           </a:p>
@@ -2399,7 +2399,7 @@
           <a:p>
             <a:fld id="{43FB9E9D-08C5-4740-AC9D-790C2406D3A2}" type="datetimeFigureOut">
               <a:rPr lang="en-GB" smtClean="0"/>
-              <a:t>05/10/2019</a:t>
+              <a:t>10/02/2020</a:t>
             </a:fld>
             <a:endParaRPr lang="en-GB"/>
           </a:p>
@@ -2688,7 +2688,7 @@
           <a:p>
             <a:fld id="{43FB9E9D-08C5-4740-AC9D-790C2406D3A2}" type="datetimeFigureOut">
               <a:rPr lang="en-GB" smtClean="0"/>
-              <a:t>05/10/2019</a:t>
+              <a:t>10/02/2020</a:t>
             </a:fld>
             <a:endParaRPr lang="en-GB"/>
           </a:p>
@@ -2931,7 +2931,7 @@
           <a:p>
             <a:fld id="{43FB9E9D-08C5-4740-AC9D-790C2406D3A2}" type="datetimeFigureOut">
               <a:rPr lang="en-GB" smtClean="0"/>
-              <a:t>05/10/2019</a:t>
+              <a:t>10/02/2020</a:t>
             </a:fld>
             <a:endParaRPr lang="en-GB"/>
           </a:p>
@@ -3398,8 +3398,8 @@
         </p:nvSpPr>
         <p:spPr>
           <a:xfrm>
-            <a:off x="8738961" y="5127439"/>
-            <a:ext cx="2241319" cy="923330"/>
+            <a:off x="7514994" y="4213660"/>
+            <a:ext cx="3841116" cy="1569660"/>
           </a:xfrm>
           <a:prstGeom prst="rect">
             <a:avLst/>
@@ -3414,7 +3414,7 @@
           <a:p>
             <a:pPr algn="ctr"/>
             <a:r>
-              <a:rPr lang="en-US" sz="5400" b="1" cap="none" spc="0" dirty="0">
+              <a:rPr lang="en-US" sz="9600" b="1" cap="none" spc="0" dirty="0">
                 <a:ln w="13462">
                   <a:solidFill>
                     <a:schemeClr val="bg1"/>
@@ -3441,6 +3441,273 @@
           </a:p>
         </p:txBody>
       </p:sp>
+      <p:sp>
+        <p:nvSpPr>
+          <p:cNvPr id="4" name="Subtitle 2">
+            <a:extLst>
+              <a:ext uri="{FF2B5EF4-FFF2-40B4-BE49-F238E27FC236}">
+                <a16:creationId xmlns:a16="http://schemas.microsoft.com/office/drawing/2014/main" id="{2561096D-F808-408E-B659-656078388A94}"/>
+              </a:ext>
+            </a:extLst>
+          </p:cNvPr>
+          <p:cNvSpPr>
+            <a:spLocks noGrp="1"/>
+          </p:cNvSpPr>
+          <p:nvPr>
+            <p:ph type="subTitle" idx="1"/>
+          </p:nvPr>
+        </p:nvSpPr>
+        <p:spPr>
+          <a:xfrm>
+            <a:off x="0" y="5813164"/>
+            <a:ext cx="4651513" cy="1282440"/>
+          </a:xfrm>
+        </p:spPr>
+        <p:txBody>
+          <a:bodyPr>
+            <a:normAutofit/>
+          </a:bodyPr>
+          <a:lstStyle/>
+          <a:p>
+            <a:pPr algn="l">
+              <a:lnSpc>
+                <a:spcPct val="100000"/>
+              </a:lnSpc>
+            </a:pPr>
+            <a:r>
+              <a:rPr lang="en-GB" dirty="0">
+                <a:solidFill>
+                  <a:schemeClr val="bg1"/>
+                </a:solidFill>
+                <a:effectLst/>
+                <a:latin typeface="Calisto MT" panose="02040603050505030304" pitchFamily="18" charset="0"/>
+              </a:rPr>
+              <a:t>‘L’ for Leader board </a:t>
+            </a:r>
+          </a:p>
+          <a:p>
+            <a:pPr algn="l">
+              <a:lnSpc>
+                <a:spcPct val="100000"/>
+              </a:lnSpc>
+            </a:pPr>
+            <a:r>
+              <a:rPr lang="en-GB" dirty="0">
+                <a:solidFill>
+                  <a:schemeClr val="bg1"/>
+                </a:solidFill>
+                <a:effectLst/>
+                <a:latin typeface="Calisto MT" panose="02040603050505030304" pitchFamily="18" charset="0"/>
+              </a:rPr>
+              <a:t>‘I’ for Instructions</a:t>
+            </a:r>
+          </a:p>
+        </p:txBody>
+      </p:sp>
+      <p:sp>
+        <p:nvSpPr>
+          <p:cNvPr id="7" name="Subtitle 2">
+            <a:extLst>
+              <a:ext uri="{FF2B5EF4-FFF2-40B4-BE49-F238E27FC236}">
+                <a16:creationId xmlns:a16="http://schemas.microsoft.com/office/drawing/2014/main" id="{03AF123A-17F3-478E-8A80-4A4659D2B700}"/>
+              </a:ext>
+            </a:extLst>
+          </p:cNvPr>
+          <p:cNvSpPr txBox="1">
+            <a:spLocks/>
+          </p:cNvSpPr>
+          <p:nvPr/>
+        </p:nvSpPr>
+        <p:spPr>
+          <a:xfrm>
+            <a:off x="7901188" y="5617308"/>
+            <a:ext cx="3360275" cy="837076"/>
+          </a:xfrm>
+          <a:prstGeom prst="rect">
+            <a:avLst/>
+          </a:prstGeom>
+        </p:spPr>
+        <p:txBody>
+          <a:bodyPr vert="horz" lIns="91440" tIns="45720" rIns="91440" bIns="45720" rtlCol="0">
+            <a:normAutofit/>
+          </a:bodyPr>
+          <a:lstStyle>
+            <a:lvl1pPr marL="0" indent="0" algn="ctr" defTabSz="914400" rtl="0" eaLnBrk="1" latinLnBrk="0" hangingPunct="1">
+              <a:lnSpc>
+                <a:spcPct val="90000"/>
+              </a:lnSpc>
+              <a:spcBef>
+                <a:spcPts val="1000"/>
+              </a:spcBef>
+              <a:buFont typeface="Arial" panose="020B0604020202020204" pitchFamily="34" charset="0"/>
+              <a:buNone/>
+              <a:defRPr sz="2400" kern="1200">
+                <a:solidFill>
+                  <a:schemeClr val="tx1"/>
+                </a:solidFill>
+                <a:latin typeface="+mn-lt"/>
+                <a:ea typeface="+mn-ea"/>
+                <a:cs typeface="+mn-cs"/>
+              </a:defRPr>
+            </a:lvl1pPr>
+            <a:lvl2pPr marL="457200" indent="0" algn="ctr" defTabSz="914400" rtl="0" eaLnBrk="1" latinLnBrk="0" hangingPunct="1">
+              <a:lnSpc>
+                <a:spcPct val="90000"/>
+              </a:lnSpc>
+              <a:spcBef>
+                <a:spcPts val="500"/>
+              </a:spcBef>
+              <a:buFont typeface="Arial" panose="020B0604020202020204" pitchFamily="34" charset="0"/>
+              <a:buNone/>
+              <a:defRPr sz="2000" kern="1200">
+                <a:solidFill>
+                  <a:schemeClr val="tx1"/>
+                </a:solidFill>
+                <a:latin typeface="+mn-lt"/>
+                <a:ea typeface="+mn-ea"/>
+                <a:cs typeface="+mn-cs"/>
+              </a:defRPr>
+            </a:lvl2pPr>
+            <a:lvl3pPr marL="914400" indent="0" algn="ctr" defTabSz="914400" rtl="0" eaLnBrk="1" latinLnBrk="0" hangingPunct="1">
+              <a:lnSpc>
+                <a:spcPct val="90000"/>
+              </a:lnSpc>
+              <a:spcBef>
+                <a:spcPts val="500"/>
+              </a:spcBef>
+              <a:buFont typeface="Arial" panose="020B0604020202020204" pitchFamily="34" charset="0"/>
+              <a:buNone/>
+              <a:defRPr sz="1800" kern="1200">
+                <a:solidFill>
+                  <a:schemeClr val="tx1"/>
+                </a:solidFill>
+                <a:latin typeface="+mn-lt"/>
+                <a:ea typeface="+mn-ea"/>
+                <a:cs typeface="+mn-cs"/>
+              </a:defRPr>
+            </a:lvl3pPr>
+            <a:lvl4pPr marL="1371600" indent="0" algn="ctr" defTabSz="914400" rtl="0" eaLnBrk="1" latinLnBrk="0" hangingPunct="1">
+              <a:lnSpc>
+                <a:spcPct val="90000"/>
+              </a:lnSpc>
+              <a:spcBef>
+                <a:spcPts val="500"/>
+              </a:spcBef>
+              <a:buFont typeface="Arial" panose="020B0604020202020204" pitchFamily="34" charset="0"/>
+              <a:buNone/>
+              <a:defRPr sz="1600" kern="1200">
+                <a:solidFill>
+                  <a:schemeClr val="tx1"/>
+                </a:solidFill>
+                <a:latin typeface="+mn-lt"/>
+                <a:ea typeface="+mn-ea"/>
+                <a:cs typeface="+mn-cs"/>
+              </a:defRPr>
+            </a:lvl4pPr>
+            <a:lvl5pPr marL="1828800" indent="0" algn="ctr" defTabSz="914400" rtl="0" eaLnBrk="1" latinLnBrk="0" hangingPunct="1">
+              <a:lnSpc>
+                <a:spcPct val="90000"/>
+              </a:lnSpc>
+              <a:spcBef>
+                <a:spcPts val="500"/>
+              </a:spcBef>
+              <a:buFont typeface="Arial" panose="020B0604020202020204" pitchFamily="34" charset="0"/>
+              <a:buNone/>
+              <a:defRPr sz="1600" kern="1200">
+                <a:solidFill>
+                  <a:schemeClr val="tx1"/>
+                </a:solidFill>
+                <a:latin typeface="+mn-lt"/>
+                <a:ea typeface="+mn-ea"/>
+                <a:cs typeface="+mn-cs"/>
+              </a:defRPr>
+            </a:lvl5pPr>
+            <a:lvl6pPr marL="2286000" indent="0" algn="ctr" defTabSz="914400" rtl="0" eaLnBrk="1" latinLnBrk="0" hangingPunct="1">
+              <a:lnSpc>
+                <a:spcPct val="90000"/>
+              </a:lnSpc>
+              <a:spcBef>
+                <a:spcPts val="500"/>
+              </a:spcBef>
+              <a:buFont typeface="Arial" panose="020B0604020202020204" pitchFamily="34" charset="0"/>
+              <a:buNone/>
+              <a:defRPr sz="1600" kern="1200">
+                <a:solidFill>
+                  <a:schemeClr val="tx1"/>
+                </a:solidFill>
+                <a:latin typeface="+mn-lt"/>
+                <a:ea typeface="+mn-ea"/>
+                <a:cs typeface="+mn-cs"/>
+              </a:defRPr>
+            </a:lvl6pPr>
+            <a:lvl7pPr marL="2743200" indent="0" algn="ctr" defTabSz="914400" rtl="0" eaLnBrk="1" latinLnBrk="0" hangingPunct="1">
+              <a:lnSpc>
+                <a:spcPct val="90000"/>
+              </a:lnSpc>
+              <a:spcBef>
+                <a:spcPts val="500"/>
+              </a:spcBef>
+              <a:buFont typeface="Arial" panose="020B0604020202020204" pitchFamily="34" charset="0"/>
+              <a:buNone/>
+              <a:defRPr sz="1600" kern="1200">
+                <a:solidFill>
+                  <a:schemeClr val="tx1"/>
+                </a:solidFill>
+                <a:latin typeface="+mn-lt"/>
+                <a:ea typeface="+mn-ea"/>
+                <a:cs typeface="+mn-cs"/>
+              </a:defRPr>
+            </a:lvl7pPr>
+            <a:lvl8pPr marL="3200400" indent="0" algn="ctr" defTabSz="914400" rtl="0" eaLnBrk="1" latinLnBrk="0" hangingPunct="1">
+              <a:lnSpc>
+                <a:spcPct val="90000"/>
+              </a:lnSpc>
+              <a:spcBef>
+                <a:spcPts val="500"/>
+              </a:spcBef>
+              <a:buFont typeface="Arial" panose="020B0604020202020204" pitchFamily="34" charset="0"/>
+              <a:buNone/>
+              <a:defRPr sz="1600" kern="1200">
+                <a:solidFill>
+                  <a:schemeClr val="tx1"/>
+                </a:solidFill>
+                <a:latin typeface="+mn-lt"/>
+                <a:ea typeface="+mn-ea"/>
+                <a:cs typeface="+mn-cs"/>
+              </a:defRPr>
+            </a:lvl8pPr>
+            <a:lvl9pPr marL="3657600" indent="0" algn="ctr" defTabSz="914400" rtl="0" eaLnBrk="1" latinLnBrk="0" hangingPunct="1">
+              <a:lnSpc>
+                <a:spcPct val="90000"/>
+              </a:lnSpc>
+              <a:spcBef>
+                <a:spcPts val="500"/>
+              </a:spcBef>
+              <a:buFont typeface="Arial" panose="020B0604020202020204" pitchFamily="34" charset="0"/>
+              <a:buNone/>
+              <a:defRPr sz="1600" kern="1200">
+                <a:solidFill>
+                  <a:schemeClr val="tx1"/>
+                </a:solidFill>
+                <a:latin typeface="+mn-lt"/>
+                <a:ea typeface="+mn-ea"/>
+                <a:cs typeface="+mn-cs"/>
+              </a:defRPr>
+            </a:lvl9pPr>
+          </a:lstStyle>
+          <a:p>
+            <a:r>
+              <a:rPr lang="en-GB" dirty="0">
+                <a:solidFill>
+                  <a:schemeClr val="bg1"/>
+                </a:solidFill>
+                <a:latin typeface="Calisto MT" panose="02040603050505030304" pitchFamily="18" charset="0"/>
+              </a:rPr>
+              <a:t>Press ‘Enter’ to play!</a:t>
+            </a:r>
+          </a:p>
+        </p:txBody>
+      </p:sp>
     </p:spTree>
     <p:extLst>
       <p:ext uri="{BB962C8B-B14F-4D97-AF65-F5344CB8AC3E}">
@@ -3457,6 +3724,14 @@
 <file path=ppt/slides/slide2.xml><?xml version="1.0" encoding="utf-8"?>
 <p:sld xmlns:a="http://schemas.openxmlformats.org/drawingml/2006/main" xmlns:r="http://schemas.openxmlformats.org/officeDocument/2006/relationships" xmlns:p="http://schemas.openxmlformats.org/presentationml/2006/main">
   <p:cSld>
+    <p:bg>
+      <p:bgPr>
+        <a:solidFill>
+          <a:schemeClr val="bg1"/>
+        </a:solidFill>
+        <a:effectLst/>
+      </p:bgPr>
+    </p:bg>
     <p:spTree>
       <p:nvGrpSpPr>
         <p:cNvPr id="1" name=""/>
@@ -3473,28 +3748,29 @@
       </p:grpSpPr>
       <p:pic>
         <p:nvPicPr>
-          <p:cNvPr id="3" name="Picture 2">
-            <a:extLst>
-              <a:ext uri="{FF2B5EF4-FFF2-40B4-BE49-F238E27FC236}">
-                <a16:creationId xmlns:a16="http://schemas.microsoft.com/office/drawing/2014/main" id="{E934575E-FF81-42C2-938B-F52E94588A9F}"/>
+          <p:cNvPr id="4" name="Content Placeholder 3">
+            <a:extLst>
+              <a:ext uri="{FF2B5EF4-FFF2-40B4-BE49-F238E27FC236}">
+                <a16:creationId xmlns:a16="http://schemas.microsoft.com/office/drawing/2014/main" id="{E9BD740D-27CD-4B9C-B1BF-2AAB59372603}"/>
               </a:ext>
             </a:extLst>
           </p:cNvPr>
           <p:cNvPicPr>
-            <a:picLocks noChangeAspect="1"/>
+            <a:picLocks noGrp="1" noChangeAspect="1"/>
           </p:cNvPicPr>
-          <p:nvPr/>
+          <p:nvPr>
+            <p:ph idx="1"/>
+          </p:nvPr>
         </p:nvPicPr>
-        <p:blipFill>
+        <p:blipFill rotWithShape="1">
           <a:blip r:embed="rId2"/>
-          <a:stretch>
-            <a:fillRect/>
-          </a:stretch>
+          <a:srcRect/>
+          <a:stretch/>
         </p:blipFill>
         <p:spPr>
           <a:xfrm>
-            <a:off x="0" y="1673"/>
-            <a:ext cx="12192000" cy="6854653"/>
+            <a:off x="20" y="10"/>
+            <a:ext cx="12191980" cy="6857990"/>
           </a:xfrm>
           <a:prstGeom prst="rect">
             <a:avLst/>
@@ -3504,7 +3780,7 @@
     </p:spTree>
     <p:extLst>
       <p:ext uri="{BB962C8B-B14F-4D97-AF65-F5344CB8AC3E}">
-        <p14:creationId xmlns:p14="http://schemas.microsoft.com/office/powerpoint/2010/main" val="4223489610"/>
+        <p14:creationId xmlns:p14="http://schemas.microsoft.com/office/powerpoint/2010/main" val="285048537"/>
       </p:ext>
     </p:extLst>
   </p:cSld>

</xml_diff>